<commit_message>
Actualizar contenido de la presentación de la propuesta
</commit_message>
<xml_diff>
--- a/presentation/propuesta.pptx
+++ b/presentation/propuesta.pptx
@@ -9,11 +9,12 @@
     <p:sldId id="257" r:id="rId3"/>
     <p:sldId id="258" r:id="rId4"/>
     <p:sldId id="259" r:id="rId5"/>
-    <p:sldId id="260" r:id="rId6"/>
-    <p:sldId id="262" r:id="rId7"/>
-    <p:sldId id="263" r:id="rId8"/>
-    <p:sldId id="264" r:id="rId9"/>
-    <p:sldId id="261" r:id="rId10"/>
+    <p:sldId id="265" r:id="rId6"/>
+    <p:sldId id="260" r:id="rId7"/>
+    <p:sldId id="262" r:id="rId8"/>
+    <p:sldId id="263" r:id="rId9"/>
+    <p:sldId id="264" r:id="rId10"/>
+    <p:sldId id="261" r:id="rId11"/>
   </p:sldIdLst>
   <p:sldSz cx="12192000" cy="6858000"/>
   <p:notesSz cx="6858000" cy="9144000"/>
@@ -3665,6 +3666,387 @@
 </p:sld>
 </file>
 
+<file path=ppt/slides/slide10.xml><?xml version="1.0" encoding="utf-8"?>
+<p:sld xmlns:a="http://schemas.openxmlformats.org/drawingml/2006/main" xmlns:r="http://schemas.openxmlformats.org/officeDocument/2006/relationships" xmlns:p="http://schemas.openxmlformats.org/presentationml/2006/main">
+  <p:cSld>
+    <p:bg>
+      <p:bgPr>
+        <a:solidFill>
+          <a:schemeClr val="bg1"/>
+        </a:solidFill>
+        <a:effectLst/>
+      </p:bgPr>
+    </p:bg>
+    <p:spTree>
+      <p:nvGrpSpPr>
+        <p:cNvPr id="1" name=""/>
+        <p:cNvGrpSpPr/>
+        <p:nvPr/>
+      </p:nvGrpSpPr>
+      <p:grpSpPr>
+        <a:xfrm>
+          <a:off x="0" y="0"/>
+          <a:ext cx="0" cy="0"/>
+          <a:chOff x="0" y="0"/>
+          <a:chExt cx="0" cy="0"/>
+        </a:xfrm>
+      </p:grpSpPr>
+      <p:sp useBgFill="1">
+        <p:nvSpPr>
+          <p:cNvPr id="10" name="Rectangle 9">
+            <a:extLst>
+              <a:ext uri="{FF2B5EF4-FFF2-40B4-BE49-F238E27FC236}">
+                <a16:creationId xmlns:a16="http://schemas.microsoft.com/office/drawing/2014/main" id="{AB8C311F-7253-4AED-9701-7FC0708C41C7}"/>
+              </a:ext>
+              <a:ext uri="{C183D7F6-B498-43B3-948B-1728B52AA6E4}">
+                <adec:decorative xmlns:adec="http://schemas.microsoft.com/office/drawing/2017/decorative" val="1"/>
+              </a:ext>
+            </a:extLst>
+          </p:cNvPr>
+          <p:cNvSpPr>
+            <a:spLocks noGrp="1" noRot="1" noChangeAspect="1" noMove="1" noResize="1" noEditPoints="1" noAdjustHandles="1" noChangeArrowheads="1" noChangeShapeType="1" noTextEdit="1"/>
+          </p:cNvSpPr>
+          <p:nvPr>
+            <p:extLst>
+              <p:ext uri="{386F3935-93C4-4BCD-93E2-E3B085C9AB24}">
+                <p16:designElem xmlns:p16="http://schemas.microsoft.com/office/powerpoint/2015/main" val="1"/>
+              </p:ext>
+            </p:extLst>
+          </p:nvPr>
+        </p:nvSpPr>
+        <p:spPr>
+          <a:xfrm>
+            <a:off x="0" y="0"/>
+            <a:ext cx="12192000" cy="6858000"/>
+          </a:xfrm>
+          <a:prstGeom prst="rect">
+            <a:avLst/>
+          </a:prstGeom>
+          <a:ln w="12700" cap="flat" cmpd="sng" algn="ctr">
+            <a:noFill/>
+            <a:prstDash val="solid"/>
+            <a:miter lim="800000"/>
+          </a:ln>
+          <a:effectLst/>
+          <a:extLst>
+            <a:ext uri="{91240B29-F687-4F45-9708-019B960494DF}">
+              <a14:hiddenLine xmlns:a14="http://schemas.microsoft.com/office/drawing/2010/main" w="12700" cap="flat" cmpd="sng" algn="ctr">
+                <a:solidFill>
+                  <a:schemeClr val="accent1">
+                    <a:shade val="50000"/>
+                  </a:schemeClr>
+                </a:solidFill>
+                <a:prstDash val="solid"/>
+                <a:miter lim="800000"/>
+              </a14:hiddenLine>
+            </a:ext>
+          </a:extLst>
+        </p:spPr>
+        <p:style>
+          <a:lnRef idx="2">
+            <a:schemeClr val="accent1">
+              <a:shade val="50000"/>
+            </a:schemeClr>
+          </a:lnRef>
+          <a:fillRef idx="1">
+            <a:schemeClr val="accent1"/>
+          </a:fillRef>
+          <a:effectRef idx="0">
+            <a:schemeClr val="accent1"/>
+          </a:effectRef>
+          <a:fontRef idx="minor">
+            <a:schemeClr val="lt1"/>
+          </a:fontRef>
+        </p:style>
+        <p:txBody>
+          <a:bodyPr rtlCol="0" anchor="ctr"/>
+          <a:lstStyle/>
+          <a:p>
+            <a:pPr algn="ctr"/>
+            <a:endParaRPr lang="en-US"/>
+          </a:p>
+        </p:txBody>
+      </p:sp>
+      <p:sp>
+        <p:nvSpPr>
+          <p:cNvPr id="12" name="Rectangle 11">
+            <a:extLst>
+              <a:ext uri="{FF2B5EF4-FFF2-40B4-BE49-F238E27FC236}">
+                <a16:creationId xmlns:a16="http://schemas.microsoft.com/office/drawing/2014/main" id="{FD073016-B734-483B-8953-5BADEE145112}"/>
+              </a:ext>
+              <a:ext uri="{C183D7F6-B498-43B3-948B-1728B52AA6E4}">
+                <adec:decorative xmlns:adec="http://schemas.microsoft.com/office/drawing/2017/decorative" val="1"/>
+              </a:ext>
+            </a:extLst>
+          </p:cNvPr>
+          <p:cNvSpPr>
+            <a:spLocks noGrp="1" noRot="1" noChangeAspect="1" noMove="1" noResize="1" noEditPoints="1" noAdjustHandles="1" noChangeArrowheads="1" noChangeShapeType="1" noTextEdit="1"/>
+          </p:cNvSpPr>
+          <p:nvPr>
+            <p:extLst>
+              <p:ext uri="{386F3935-93C4-4BCD-93E2-E3B085C9AB24}">
+                <p16:designElem xmlns:p16="http://schemas.microsoft.com/office/powerpoint/2015/main" val="1"/>
+              </p:ext>
+            </p:extLst>
+          </p:nvPr>
+        </p:nvSpPr>
+        <p:spPr>
+          <a:xfrm>
+            <a:off x="4038600" y="0"/>
+            <a:ext cx="8157458" cy="6858000"/>
+          </a:xfrm>
+          <a:prstGeom prst="rect">
+            <a:avLst/>
+          </a:prstGeom>
+          <a:gradFill>
+            <a:gsLst>
+              <a:gs pos="2000">
+                <a:schemeClr val="accent1"/>
+              </a:gs>
+              <a:gs pos="78000">
+                <a:schemeClr val="accent1">
+                  <a:lumMod val="50000"/>
+                </a:schemeClr>
+              </a:gs>
+              <a:gs pos="100000">
+                <a:srgbClr val="000000">
+                  <a:alpha val="85000"/>
+                </a:srgbClr>
+              </a:gs>
+            </a:gsLst>
+            <a:lin ang="18000000" scaled="0"/>
+          </a:gradFill>
+          <a:ln>
+            <a:noFill/>
+          </a:ln>
+        </p:spPr>
+        <p:style>
+          <a:lnRef idx="2">
+            <a:schemeClr val="accent1">
+              <a:shade val="50000"/>
+            </a:schemeClr>
+          </a:lnRef>
+          <a:fillRef idx="1">
+            <a:schemeClr val="accent1"/>
+          </a:fillRef>
+          <a:effectRef idx="0">
+            <a:schemeClr val="accent1"/>
+          </a:effectRef>
+          <a:fontRef idx="minor">
+            <a:schemeClr val="lt1"/>
+          </a:fontRef>
+        </p:style>
+        <p:txBody>
+          <a:bodyPr rtlCol="0" anchor="ctr"/>
+          <a:lstStyle/>
+          <a:p>
+            <a:pPr algn="ctr"/>
+            <a:endParaRPr lang="en-US"/>
+          </a:p>
+        </p:txBody>
+      </p:sp>
+      <p:sp>
+        <p:nvSpPr>
+          <p:cNvPr id="14" name="Rectangle 13">
+            <a:extLst>
+              <a:ext uri="{FF2B5EF4-FFF2-40B4-BE49-F238E27FC236}">
+                <a16:creationId xmlns:a16="http://schemas.microsoft.com/office/drawing/2014/main" id="{90A7EAB6-59D3-4325-8DE6-E0CA4009CE53}"/>
+              </a:ext>
+              <a:ext uri="{C183D7F6-B498-43B3-948B-1728B52AA6E4}">
+                <adec:decorative xmlns:adec="http://schemas.microsoft.com/office/drawing/2017/decorative" val="1"/>
+              </a:ext>
+            </a:extLst>
+          </p:cNvPr>
+          <p:cNvSpPr>
+            <a:spLocks noGrp="1" noRot="1" noChangeAspect="1" noMove="1" noResize="1" noEditPoints="1" noAdjustHandles="1" noChangeArrowheads="1" noChangeShapeType="1" noTextEdit="1"/>
+          </p:cNvSpPr>
+          <p:nvPr>
+            <p:extLst>
+              <p:ext uri="{386F3935-93C4-4BCD-93E2-E3B085C9AB24}">
+                <p16:designElem xmlns:p16="http://schemas.microsoft.com/office/powerpoint/2015/main" val="1"/>
+              </p:ext>
+            </p:extLst>
+          </p:nvPr>
+        </p:nvSpPr>
+        <p:spPr>
+          <a:xfrm flipH="1">
+            <a:off x="4034537" y="1839884"/>
+            <a:ext cx="8157460" cy="5017687"/>
+          </a:xfrm>
+          <a:prstGeom prst="rect">
+            <a:avLst/>
+          </a:prstGeom>
+          <a:gradFill>
+            <a:gsLst>
+              <a:gs pos="0">
+                <a:schemeClr val="accent1">
+                  <a:lumMod val="60000"/>
+                  <a:lumOff val="40000"/>
+                  <a:alpha val="30000"/>
+                </a:schemeClr>
+              </a:gs>
+              <a:gs pos="100000">
+                <a:srgbClr val="000000">
+                  <a:alpha val="44000"/>
+                </a:srgbClr>
+              </a:gs>
+            </a:gsLst>
+            <a:lin ang="4800000" scaled="0"/>
+          </a:gradFill>
+          <a:ln>
+            <a:noFill/>
+          </a:ln>
+        </p:spPr>
+        <p:style>
+          <a:lnRef idx="2">
+            <a:schemeClr val="accent1">
+              <a:shade val="50000"/>
+            </a:schemeClr>
+          </a:lnRef>
+          <a:fillRef idx="1">
+            <a:schemeClr val="accent1"/>
+          </a:fillRef>
+          <a:effectRef idx="0">
+            <a:schemeClr val="accent1"/>
+          </a:effectRef>
+          <a:fontRef idx="minor">
+            <a:schemeClr val="lt1"/>
+          </a:fontRef>
+        </p:style>
+        <p:txBody>
+          <a:bodyPr rtlCol="0" anchor="ctr"/>
+          <a:lstStyle/>
+          <a:p>
+            <a:pPr algn="ctr"/>
+            <a:endParaRPr lang="en-US"/>
+          </a:p>
+        </p:txBody>
+      </p:sp>
+      <p:sp>
+        <p:nvSpPr>
+          <p:cNvPr id="16" name="Rectangle 15">
+            <a:extLst>
+              <a:ext uri="{FF2B5EF4-FFF2-40B4-BE49-F238E27FC236}">
+                <a16:creationId xmlns:a16="http://schemas.microsoft.com/office/drawing/2014/main" id="{A8D57A06-A426-446D-B02C-A2DC6B62E45E}"/>
+              </a:ext>
+              <a:ext uri="{C183D7F6-B498-43B3-948B-1728B52AA6E4}">
+                <adec:decorative xmlns:adec="http://schemas.microsoft.com/office/drawing/2017/decorative" val="1"/>
+              </a:ext>
+            </a:extLst>
+          </p:cNvPr>
+          <p:cNvSpPr>
+            <a:spLocks noGrp="1" noRot="1" noChangeAspect="1" noMove="1" noResize="1" noEditPoints="1" noAdjustHandles="1" noChangeArrowheads="1" noChangeShapeType="1" noTextEdit="1"/>
+          </p:cNvSpPr>
+          <p:nvPr>
+            <p:extLst>
+              <p:ext uri="{386F3935-93C4-4BCD-93E2-E3B085C9AB24}">
+                <p16:designElem xmlns:p16="http://schemas.microsoft.com/office/powerpoint/2015/main" val="1"/>
+              </p:ext>
+            </p:extLst>
+          </p:nvPr>
+        </p:nvSpPr>
+        <p:spPr>
+          <a:xfrm rot="5400000" flipH="1">
+            <a:off x="4063179" y="-33131"/>
+            <a:ext cx="6857999" cy="6923403"/>
+          </a:xfrm>
+          <a:prstGeom prst="rect">
+            <a:avLst/>
+          </a:prstGeom>
+          <a:gradFill>
+            <a:gsLst>
+              <a:gs pos="56000">
+                <a:schemeClr val="accent1">
+                  <a:lumMod val="60000"/>
+                  <a:lumOff val="40000"/>
+                  <a:alpha val="0"/>
+                </a:schemeClr>
+              </a:gs>
+              <a:gs pos="100000">
+                <a:schemeClr val="accent1"/>
+              </a:gs>
+            </a:gsLst>
+            <a:lin ang="6600000" scaled="0"/>
+          </a:gradFill>
+          <a:ln>
+            <a:noFill/>
+          </a:ln>
+        </p:spPr>
+        <p:style>
+          <a:lnRef idx="2">
+            <a:schemeClr val="accent1">
+              <a:shade val="50000"/>
+            </a:schemeClr>
+          </a:lnRef>
+          <a:fillRef idx="1">
+            <a:schemeClr val="accent1"/>
+          </a:fillRef>
+          <a:effectRef idx="0">
+            <a:schemeClr val="accent1"/>
+          </a:effectRef>
+          <a:fontRef idx="minor">
+            <a:schemeClr val="lt1"/>
+          </a:fontRef>
+        </p:style>
+        <p:txBody>
+          <a:bodyPr rtlCol="0" anchor="ctr"/>
+          <a:lstStyle/>
+          <a:p>
+            <a:pPr algn="ctr"/>
+            <a:endParaRPr lang="en-US"/>
+          </a:p>
+        </p:txBody>
+      </p:sp>
+      <p:pic>
+        <p:nvPicPr>
+          <p:cNvPr id="5" name="Marcador de contenido 4" descr="Texto&#10;&#10;Descripción generada automáticamente con confianza media">
+            <a:extLst>
+              <a:ext uri="{FF2B5EF4-FFF2-40B4-BE49-F238E27FC236}">
+                <a16:creationId xmlns:a16="http://schemas.microsoft.com/office/drawing/2014/main" id="{8B447023-B011-957F-E3BC-BA17E5376A8A}"/>
+              </a:ext>
+            </a:extLst>
+          </p:cNvPr>
+          <p:cNvPicPr>
+            <a:picLocks noGrp="1" noChangeAspect="1"/>
+          </p:cNvPicPr>
+          <p:nvPr>
+            <p:ph idx="1"/>
+          </p:nvPr>
+        </p:nvPicPr>
+        <p:blipFill rotWithShape="1">
+          <a:blip r:embed="rId2">
+            <a:extLst>
+              <a:ext uri="{28A0092B-C50C-407E-A947-70E740481C1C}">
+                <a14:useLocalDpi xmlns:a14="http://schemas.microsoft.com/office/drawing/2010/main" val="0"/>
+              </a:ext>
+            </a:extLst>
+          </a:blip>
+          <a:srcRect t="1694" b="4612"/>
+          <a:stretch/>
+        </p:blipFill>
+        <p:spPr>
+          <a:xfrm>
+            <a:off x="457200" y="457200"/>
+            <a:ext cx="11277600" cy="5943600"/>
+          </a:xfrm>
+          <a:prstGeom prst="rect">
+            <a:avLst/>
+          </a:prstGeom>
+        </p:spPr>
+      </p:pic>
+    </p:spTree>
+    <p:extLst>
+      <p:ext uri="{BB962C8B-B14F-4D97-AF65-F5344CB8AC3E}">
+        <p14:creationId xmlns:p14="http://schemas.microsoft.com/office/powerpoint/2010/main" val="2357855530"/>
+      </p:ext>
+    </p:extLst>
+  </p:cSld>
+  <p:clrMapOvr>
+    <a:masterClrMapping/>
+  </p:clrMapOvr>
+</p:sld>
+</file>
+
 <file path=ppt/slides/slide2.xml><?xml version="1.0" encoding="utf-8"?>
 <p:sld xmlns:a="http://schemas.openxmlformats.org/drawingml/2006/main" xmlns:r="http://schemas.openxmlformats.org/officeDocument/2006/relationships" xmlns:p="http://schemas.openxmlformats.org/presentationml/2006/main">
   <p:cSld>
@@ -4795,6 +5177,203 @@
           </a:prstGeom>
         </p:spPr>
       </p:pic>
+      <p:sp>
+        <p:nvSpPr>
+          <p:cNvPr id="7" name="Rectángulo 6">
+            <a:extLst>
+              <a:ext uri="{FF2B5EF4-FFF2-40B4-BE49-F238E27FC236}">
+                <a16:creationId xmlns:a16="http://schemas.microsoft.com/office/drawing/2014/main" id="{11C4BFA3-7848-63CE-68AC-DBC7AA3A8C8F}"/>
+              </a:ext>
+            </a:extLst>
+          </p:cNvPr>
+          <p:cNvSpPr/>
+          <p:nvPr/>
+        </p:nvSpPr>
+        <p:spPr>
+          <a:xfrm>
+            <a:off x="6210300" y="558800"/>
+            <a:ext cx="5372100" cy="5727700"/>
+          </a:xfrm>
+          <a:prstGeom prst="rect">
+            <a:avLst/>
+          </a:prstGeom>
+          <a:solidFill>
+            <a:schemeClr val="tx1"/>
+          </a:solidFill>
+          <a:ln>
+            <a:solidFill>
+              <a:schemeClr val="tx1"/>
+            </a:solidFill>
+          </a:ln>
+        </p:spPr>
+        <p:style>
+          <a:lnRef idx="2">
+            <a:schemeClr val="accent1">
+              <a:shade val="15000"/>
+            </a:schemeClr>
+          </a:lnRef>
+          <a:fillRef idx="1">
+            <a:schemeClr val="accent1"/>
+          </a:fillRef>
+          <a:effectRef idx="0">
+            <a:schemeClr val="accent1"/>
+          </a:effectRef>
+          <a:fontRef idx="minor">
+            <a:schemeClr val="lt1"/>
+          </a:fontRef>
+        </p:style>
+        <p:txBody>
+          <a:bodyPr rtlCol="0" anchor="ctr"/>
+          <a:lstStyle/>
+          <a:p>
+            <a:pPr algn="ctr"/>
+            <a:r>
+              <a:rPr lang="es-ES" sz="2400" b="1" i="0" dirty="0">
+                <a:solidFill>
+                  <a:schemeClr val="bg1"/>
+                </a:solidFill>
+                <a:effectLst/>
+                <a:latin typeface="-apple-system"/>
+              </a:rPr>
+              <a:t>Objetivos</a:t>
+            </a:r>
+          </a:p>
+          <a:p>
+            <a:pPr algn="ctr"/>
+            <a:endParaRPr lang="es-ES" sz="2400" b="1" i="0" dirty="0">
+              <a:solidFill>
+                <a:schemeClr val="bg1"/>
+              </a:solidFill>
+              <a:effectLst/>
+              <a:latin typeface="-apple-system"/>
+            </a:endParaRPr>
+          </a:p>
+          <a:p>
+            <a:pPr algn="l">
+              <a:buFont typeface="Arial" panose="020B0604020202020204" pitchFamily="34" charset="0"/>
+              <a:buChar char="•"/>
+            </a:pPr>
+            <a:r>
+              <a:rPr lang="es-ES" b="1" i="0" dirty="0">
+                <a:solidFill>
+                  <a:schemeClr val="bg1"/>
+                </a:solidFill>
+                <a:effectLst/>
+                <a:latin typeface="-apple-system"/>
+              </a:rPr>
+              <a:t>Identificar los criterios y parámetros necesarios</a:t>
+            </a:r>
+            <a:r>
+              <a:rPr lang="es-ES" b="0" i="0" dirty="0">
+                <a:solidFill>
+                  <a:schemeClr val="bg1"/>
+                </a:solidFill>
+                <a:effectLst/>
+                <a:latin typeface="-apple-system"/>
+              </a:rPr>
+              <a:t> para la clasificación de eventos sísmicos y la generación de alertas, tomando en cuenta la calidad de los datos recopilados.</a:t>
+            </a:r>
+          </a:p>
+          <a:p>
+            <a:pPr algn="l">
+              <a:buFont typeface="Arial" panose="020B0604020202020204" pitchFamily="34" charset="0"/>
+              <a:buChar char="•"/>
+            </a:pPr>
+            <a:endParaRPr lang="es-ES" b="0" i="0" dirty="0">
+              <a:solidFill>
+                <a:schemeClr val="bg1"/>
+              </a:solidFill>
+              <a:effectLst/>
+              <a:latin typeface="-apple-system"/>
+            </a:endParaRPr>
+          </a:p>
+          <a:p>
+            <a:pPr algn="l">
+              <a:buFont typeface="Arial" panose="020B0604020202020204" pitchFamily="34" charset="0"/>
+              <a:buChar char="•"/>
+            </a:pPr>
+            <a:endParaRPr lang="es-ES" b="0" i="0" dirty="0">
+              <a:solidFill>
+                <a:schemeClr val="bg1"/>
+              </a:solidFill>
+              <a:effectLst/>
+              <a:latin typeface="-apple-system"/>
+            </a:endParaRPr>
+          </a:p>
+          <a:p>
+            <a:pPr algn="l">
+              <a:buFont typeface="Arial" panose="020B0604020202020204" pitchFamily="34" charset="0"/>
+              <a:buChar char="•"/>
+            </a:pPr>
+            <a:r>
+              <a:rPr lang="es-ES" b="1" i="0" dirty="0">
+                <a:solidFill>
+                  <a:schemeClr val="bg1"/>
+                </a:solidFill>
+                <a:effectLst/>
+                <a:latin typeface="-apple-system"/>
+              </a:rPr>
+              <a:t>Establecer los procedimientos y protocolos </a:t>
+            </a:r>
+            <a:r>
+              <a:rPr lang="es-ES" b="0" i="0" dirty="0">
+                <a:solidFill>
+                  <a:schemeClr val="bg1"/>
+                </a:solidFill>
+                <a:effectLst/>
+                <a:latin typeface="-apple-system"/>
+              </a:rPr>
+              <a:t>para la clasificación y alerta adecuados, considerando las características de cada país y las necesidades de la comunidad.</a:t>
+            </a:r>
+          </a:p>
+          <a:p>
+            <a:pPr algn="l">
+              <a:buFont typeface="Arial" panose="020B0604020202020204" pitchFamily="34" charset="0"/>
+              <a:buChar char="•"/>
+            </a:pPr>
+            <a:endParaRPr lang="es-ES" b="0" i="0" dirty="0">
+              <a:solidFill>
+                <a:schemeClr val="bg1"/>
+              </a:solidFill>
+              <a:effectLst/>
+              <a:latin typeface="-apple-system"/>
+            </a:endParaRPr>
+          </a:p>
+          <a:p>
+            <a:pPr algn="l">
+              <a:buFont typeface="Arial" panose="020B0604020202020204" pitchFamily="34" charset="0"/>
+              <a:buChar char="•"/>
+            </a:pPr>
+            <a:endParaRPr lang="es-ES" b="0" i="0" dirty="0">
+              <a:solidFill>
+                <a:schemeClr val="bg1"/>
+              </a:solidFill>
+              <a:effectLst/>
+              <a:latin typeface="-apple-system"/>
+            </a:endParaRPr>
+          </a:p>
+          <a:p>
+            <a:pPr algn="l">
+              <a:buFont typeface="Arial" panose="020B0604020202020204" pitchFamily="34" charset="0"/>
+              <a:buChar char="•"/>
+            </a:pPr>
+            <a:r>
+              <a:rPr lang="es-ES" b="0" i="0" dirty="0">
+                <a:solidFill>
+                  <a:schemeClr val="bg1"/>
+                </a:solidFill>
+                <a:effectLst/>
+                <a:latin typeface="-apple-system"/>
+              </a:rPr>
+              <a:t>Identificar zonas con mayor cantidad sísmica de cada país</a:t>
+            </a:r>
+          </a:p>
+          <a:p>
+            <a:pPr algn="ctr"/>
+            <a:endParaRPr lang="es-PE" dirty="0"/>
+          </a:p>
+        </p:txBody>
+      </p:sp>
     </p:spTree>
     <p:extLst>
       <p:ext uri="{BB962C8B-B14F-4D97-AF65-F5344CB8AC3E}">
@@ -4835,7 +5414,7 @@
       </p:grpSpPr>
       <p:sp useBgFill="1">
         <p:nvSpPr>
-          <p:cNvPr id="15" name="Rectangle 14">
+          <p:cNvPr id="22" name="Rectangle 21">
             <a:extLst>
               <a:ext uri="{FF2B5EF4-FFF2-40B4-BE49-F238E27FC236}">
                 <a16:creationId xmlns:a16="http://schemas.microsoft.com/office/drawing/2014/main" id="{AB8C311F-7253-4AED-9701-7FC0708C41C7}"/>
@@ -4911,7 +5490,7 @@
       </p:sp>
       <p:sp>
         <p:nvSpPr>
-          <p:cNvPr id="17" name="Rectangle 16">
+          <p:cNvPr id="24" name="Rectangle 23">
             <a:extLst>
               <a:ext uri="{FF2B5EF4-FFF2-40B4-BE49-F238E27FC236}">
                 <a16:creationId xmlns:a16="http://schemas.microsoft.com/office/drawing/2014/main" id="{FD073016-B734-483B-8953-5BADEE145112}"/>
@@ -4989,7 +5568,7 @@
       </p:sp>
       <p:sp>
         <p:nvSpPr>
-          <p:cNvPr id="19" name="Rectangle 18">
+          <p:cNvPr id="26" name="Rectangle 25">
             <a:extLst>
               <a:ext uri="{FF2B5EF4-FFF2-40B4-BE49-F238E27FC236}">
                 <a16:creationId xmlns:a16="http://schemas.microsoft.com/office/drawing/2014/main" id="{90A7EAB6-59D3-4325-8DE6-E0CA4009CE53}"/>
@@ -5066,7 +5645,7 @@
       </p:sp>
       <p:sp>
         <p:nvSpPr>
-          <p:cNvPr id="21" name="Rectangle 20">
+          <p:cNvPr id="28" name="Rectangle 27">
             <a:extLst>
               <a:ext uri="{FF2B5EF4-FFF2-40B4-BE49-F238E27FC236}">
                 <a16:creationId xmlns:a16="http://schemas.microsoft.com/office/drawing/2014/main" id="{A8D57A06-A426-446D-B02C-A2DC6B62E45E}"/>
@@ -5141,6 +5720,555 @@
       </p:sp>
       <p:pic>
         <p:nvPicPr>
+          <p:cNvPr id="5" name="Marcador de contenido 4" descr="Interfaz de usuario gráfica&#10;&#10;Descripción generada automáticamente con confianza media">
+            <a:extLst>
+              <a:ext uri="{FF2B5EF4-FFF2-40B4-BE49-F238E27FC236}">
+                <a16:creationId xmlns:a16="http://schemas.microsoft.com/office/drawing/2014/main" id="{CA1466A7-0FE6-D01F-EAE5-2446BCB64401}"/>
+              </a:ext>
+            </a:extLst>
+          </p:cNvPr>
+          <p:cNvPicPr>
+            <a:picLocks noGrp="1" noChangeAspect="1"/>
+          </p:cNvPicPr>
+          <p:nvPr>
+            <p:ph idx="1"/>
+          </p:nvPr>
+        </p:nvPicPr>
+        <p:blipFill rotWithShape="1">
+          <a:blip r:embed="rId2">
+            <a:extLst>
+              <a:ext uri="{28A0092B-C50C-407E-A947-70E740481C1C}">
+                <a14:useLocalDpi xmlns:a14="http://schemas.microsoft.com/office/drawing/2010/main" val="0"/>
+              </a:ext>
+            </a:extLst>
+          </a:blip>
+          <a:srcRect t="6306"/>
+          <a:stretch/>
+        </p:blipFill>
+        <p:spPr>
+          <a:xfrm>
+            <a:off x="457200" y="457200"/>
+            <a:ext cx="11277600" cy="5943600"/>
+          </a:xfrm>
+          <a:prstGeom prst="rect">
+            <a:avLst/>
+          </a:prstGeom>
+        </p:spPr>
+      </p:pic>
+      <p:sp>
+        <p:nvSpPr>
+          <p:cNvPr id="7" name="Rectángulo 6">
+            <a:extLst>
+              <a:ext uri="{FF2B5EF4-FFF2-40B4-BE49-F238E27FC236}">
+                <a16:creationId xmlns:a16="http://schemas.microsoft.com/office/drawing/2014/main" id="{11C4BFA3-7848-63CE-68AC-DBC7AA3A8C8F}"/>
+              </a:ext>
+            </a:extLst>
+          </p:cNvPr>
+          <p:cNvSpPr/>
+          <p:nvPr/>
+        </p:nvSpPr>
+        <p:spPr>
+          <a:xfrm>
+            <a:off x="6210300" y="558800"/>
+            <a:ext cx="5372100" cy="5727700"/>
+          </a:xfrm>
+          <a:prstGeom prst="rect">
+            <a:avLst/>
+          </a:prstGeom>
+          <a:solidFill>
+            <a:schemeClr val="tx1"/>
+          </a:solidFill>
+          <a:ln>
+            <a:solidFill>
+              <a:schemeClr val="tx1"/>
+            </a:solidFill>
+          </a:ln>
+        </p:spPr>
+        <p:style>
+          <a:lnRef idx="2">
+            <a:schemeClr val="accent1">
+              <a:shade val="15000"/>
+            </a:schemeClr>
+          </a:lnRef>
+          <a:fillRef idx="1">
+            <a:schemeClr val="accent1"/>
+          </a:fillRef>
+          <a:effectRef idx="0">
+            <a:schemeClr val="accent1"/>
+          </a:effectRef>
+          <a:fontRef idx="minor">
+            <a:schemeClr val="lt1"/>
+          </a:fontRef>
+        </p:style>
+        <p:txBody>
+          <a:bodyPr rtlCol="0" anchor="ctr"/>
+          <a:lstStyle/>
+          <a:p>
+            <a:pPr algn="ctr"/>
+            <a:r>
+              <a:rPr lang="es-ES" sz="2400" b="1" i="0" dirty="0">
+                <a:solidFill>
+                  <a:schemeClr val="bg1"/>
+                </a:solidFill>
+                <a:effectLst/>
+                <a:latin typeface="-apple-system"/>
+              </a:rPr>
+              <a:t>Objetivos</a:t>
+            </a:r>
+          </a:p>
+          <a:p>
+            <a:pPr algn="l">
+              <a:buFont typeface="Arial" panose="020B0604020202020204" pitchFamily="34" charset="0"/>
+              <a:buChar char="•"/>
+            </a:pPr>
+            <a:endParaRPr lang="es-ES" sz="1700" b="0" i="0" dirty="0">
+              <a:solidFill>
+                <a:schemeClr val="bg1"/>
+              </a:solidFill>
+              <a:effectLst/>
+              <a:latin typeface="-apple-system"/>
+            </a:endParaRPr>
+          </a:p>
+          <a:p>
+            <a:pPr algn="l">
+              <a:buFont typeface="Arial" panose="020B0604020202020204" pitchFamily="34" charset="0"/>
+              <a:buChar char="•"/>
+            </a:pPr>
+            <a:r>
+              <a:rPr lang="es-ES" b="1" i="0" dirty="0">
+                <a:solidFill>
+                  <a:schemeClr val="bg1"/>
+                </a:solidFill>
+                <a:effectLst/>
+                <a:latin typeface="-apple-system"/>
+              </a:rPr>
+              <a:t>Realizar un análisis exhaustivo de la problemática sísmica en Perú</a:t>
+            </a:r>
+            <a:r>
+              <a:rPr lang="es-ES" b="0" i="0" dirty="0">
+                <a:solidFill>
+                  <a:schemeClr val="bg1"/>
+                </a:solidFill>
+                <a:effectLst/>
+                <a:latin typeface="-apple-system"/>
+              </a:rPr>
+              <a:t>, el país más sísmico de Latinoamérica, incluyendo el estudio de los datos históricos de sismos, sus características y los efectos en la población y en las estructuras.</a:t>
+            </a:r>
+          </a:p>
+          <a:p>
+            <a:pPr algn="l">
+              <a:buFont typeface="Arial" panose="020B0604020202020204" pitchFamily="34" charset="0"/>
+              <a:buChar char="•"/>
+            </a:pPr>
+            <a:endParaRPr lang="es-ES" b="0" i="0" dirty="0">
+              <a:solidFill>
+                <a:schemeClr val="bg1"/>
+              </a:solidFill>
+              <a:effectLst/>
+              <a:latin typeface="-apple-system"/>
+            </a:endParaRPr>
+          </a:p>
+          <a:p>
+            <a:pPr algn="l">
+              <a:buFont typeface="Arial" panose="020B0604020202020204" pitchFamily="34" charset="0"/>
+              <a:buChar char="•"/>
+            </a:pPr>
+            <a:endParaRPr lang="es-ES" b="0" i="0" dirty="0">
+              <a:solidFill>
+                <a:schemeClr val="bg1"/>
+              </a:solidFill>
+              <a:effectLst/>
+              <a:latin typeface="-apple-system"/>
+            </a:endParaRPr>
+          </a:p>
+          <a:p>
+            <a:pPr algn="l">
+              <a:buFont typeface="Arial" panose="020B0604020202020204" pitchFamily="34" charset="0"/>
+              <a:buChar char="•"/>
+            </a:pPr>
+            <a:r>
+              <a:rPr lang="es-ES" b="0" i="0" dirty="0">
+                <a:solidFill>
+                  <a:schemeClr val="bg1"/>
+                </a:solidFill>
+                <a:effectLst/>
+                <a:latin typeface="-apple-system"/>
+              </a:rPr>
+              <a:t>Realizar un análisis comparativo de la problemática sísmica en Perú, Estados Unidos y Japón, considerando el estudio de </a:t>
+            </a:r>
+            <a:r>
+              <a:rPr lang="es-ES" b="1" i="0" dirty="0">
+                <a:solidFill>
+                  <a:schemeClr val="bg1"/>
+                </a:solidFill>
+                <a:effectLst/>
+                <a:latin typeface="-apple-system"/>
+              </a:rPr>
+              <a:t>los datos históricos de sismos, sus características y los efectos en la población y en las estructuras</a:t>
+            </a:r>
+            <a:r>
+              <a:rPr lang="es-ES" b="0" i="0" dirty="0">
+                <a:solidFill>
+                  <a:schemeClr val="bg1"/>
+                </a:solidFill>
+                <a:effectLst/>
+                <a:latin typeface="-apple-system"/>
+              </a:rPr>
+              <a:t>, a fin de identificar similitudes, diferencias y lecciones aprendidas entre los tres países.</a:t>
+            </a:r>
+          </a:p>
+          <a:p>
+            <a:pPr algn="ctr"/>
+            <a:endParaRPr lang="es-PE" dirty="0"/>
+          </a:p>
+        </p:txBody>
+      </p:sp>
+    </p:spTree>
+    <p:extLst>
+      <p:ext uri="{BB962C8B-B14F-4D97-AF65-F5344CB8AC3E}">
+        <p14:creationId xmlns:p14="http://schemas.microsoft.com/office/powerpoint/2010/main" val="3566671963"/>
+      </p:ext>
+    </p:extLst>
+  </p:cSld>
+  <p:clrMapOvr>
+    <a:masterClrMapping/>
+  </p:clrMapOvr>
+</p:sld>
+</file>
+
+<file path=ppt/slides/slide6.xml><?xml version="1.0" encoding="utf-8"?>
+<p:sld xmlns:a="http://schemas.openxmlformats.org/drawingml/2006/main" xmlns:r="http://schemas.openxmlformats.org/officeDocument/2006/relationships" xmlns:p="http://schemas.openxmlformats.org/presentationml/2006/main">
+  <p:cSld>
+    <p:bg>
+      <p:bgPr>
+        <a:solidFill>
+          <a:schemeClr val="bg1"/>
+        </a:solidFill>
+        <a:effectLst/>
+      </p:bgPr>
+    </p:bg>
+    <p:spTree>
+      <p:nvGrpSpPr>
+        <p:cNvPr id="1" name=""/>
+        <p:cNvGrpSpPr/>
+        <p:nvPr/>
+      </p:nvGrpSpPr>
+      <p:grpSpPr>
+        <a:xfrm>
+          <a:off x="0" y="0"/>
+          <a:ext cx="0" cy="0"/>
+          <a:chOff x="0" y="0"/>
+          <a:chExt cx="0" cy="0"/>
+        </a:xfrm>
+      </p:grpSpPr>
+      <p:sp useBgFill="1">
+        <p:nvSpPr>
+          <p:cNvPr id="15" name="Rectangle 14">
+            <a:extLst>
+              <a:ext uri="{FF2B5EF4-FFF2-40B4-BE49-F238E27FC236}">
+                <a16:creationId xmlns:a16="http://schemas.microsoft.com/office/drawing/2014/main" id="{AB8C311F-7253-4AED-9701-7FC0708C41C7}"/>
+              </a:ext>
+              <a:ext uri="{C183D7F6-B498-43B3-948B-1728B52AA6E4}">
+                <adec:decorative xmlns:adec="http://schemas.microsoft.com/office/drawing/2017/decorative" val="1"/>
+              </a:ext>
+            </a:extLst>
+          </p:cNvPr>
+          <p:cNvSpPr>
+            <a:spLocks noGrp="1" noRot="1" noChangeAspect="1" noMove="1" noResize="1" noEditPoints="1" noAdjustHandles="1" noChangeArrowheads="1" noChangeShapeType="1" noTextEdit="1"/>
+          </p:cNvSpPr>
+          <p:nvPr>
+            <p:extLst>
+              <p:ext uri="{386F3935-93C4-4BCD-93E2-E3B085C9AB24}">
+                <p16:designElem xmlns:p16="http://schemas.microsoft.com/office/powerpoint/2015/main" val="1"/>
+              </p:ext>
+            </p:extLst>
+          </p:nvPr>
+        </p:nvSpPr>
+        <p:spPr>
+          <a:xfrm>
+            <a:off x="0" y="0"/>
+            <a:ext cx="12192000" cy="6858000"/>
+          </a:xfrm>
+          <a:prstGeom prst="rect">
+            <a:avLst/>
+          </a:prstGeom>
+          <a:ln w="12700" cap="flat" cmpd="sng" algn="ctr">
+            <a:noFill/>
+            <a:prstDash val="solid"/>
+            <a:miter lim="800000"/>
+          </a:ln>
+          <a:effectLst/>
+          <a:extLst>
+            <a:ext uri="{91240B29-F687-4F45-9708-019B960494DF}">
+              <a14:hiddenLine xmlns:a14="http://schemas.microsoft.com/office/drawing/2010/main" w="12700" cap="flat" cmpd="sng" algn="ctr">
+                <a:solidFill>
+                  <a:schemeClr val="accent1">
+                    <a:shade val="50000"/>
+                  </a:schemeClr>
+                </a:solidFill>
+                <a:prstDash val="solid"/>
+                <a:miter lim="800000"/>
+              </a14:hiddenLine>
+            </a:ext>
+          </a:extLst>
+        </p:spPr>
+        <p:style>
+          <a:lnRef idx="2">
+            <a:schemeClr val="accent1">
+              <a:shade val="50000"/>
+            </a:schemeClr>
+          </a:lnRef>
+          <a:fillRef idx="1">
+            <a:schemeClr val="accent1"/>
+          </a:fillRef>
+          <a:effectRef idx="0">
+            <a:schemeClr val="accent1"/>
+          </a:effectRef>
+          <a:fontRef idx="minor">
+            <a:schemeClr val="lt1"/>
+          </a:fontRef>
+        </p:style>
+        <p:txBody>
+          <a:bodyPr rtlCol="0" anchor="ctr"/>
+          <a:lstStyle/>
+          <a:p>
+            <a:pPr algn="ctr"/>
+            <a:endParaRPr lang="en-US"/>
+          </a:p>
+        </p:txBody>
+      </p:sp>
+      <p:sp>
+        <p:nvSpPr>
+          <p:cNvPr id="17" name="Rectangle 16">
+            <a:extLst>
+              <a:ext uri="{FF2B5EF4-FFF2-40B4-BE49-F238E27FC236}">
+                <a16:creationId xmlns:a16="http://schemas.microsoft.com/office/drawing/2014/main" id="{FD073016-B734-483B-8953-5BADEE145112}"/>
+              </a:ext>
+              <a:ext uri="{C183D7F6-B498-43B3-948B-1728B52AA6E4}">
+                <adec:decorative xmlns:adec="http://schemas.microsoft.com/office/drawing/2017/decorative" val="1"/>
+              </a:ext>
+            </a:extLst>
+          </p:cNvPr>
+          <p:cNvSpPr>
+            <a:spLocks noGrp="1" noRot="1" noChangeAspect="1" noMove="1" noResize="1" noEditPoints="1" noAdjustHandles="1" noChangeArrowheads="1" noChangeShapeType="1" noTextEdit="1"/>
+          </p:cNvSpPr>
+          <p:nvPr>
+            <p:extLst>
+              <p:ext uri="{386F3935-93C4-4BCD-93E2-E3B085C9AB24}">
+                <p16:designElem xmlns:p16="http://schemas.microsoft.com/office/powerpoint/2015/main" val="1"/>
+              </p:ext>
+            </p:extLst>
+          </p:nvPr>
+        </p:nvSpPr>
+        <p:spPr>
+          <a:xfrm>
+            <a:off x="4038600" y="0"/>
+            <a:ext cx="8157458" cy="6858000"/>
+          </a:xfrm>
+          <a:prstGeom prst="rect">
+            <a:avLst/>
+          </a:prstGeom>
+          <a:gradFill>
+            <a:gsLst>
+              <a:gs pos="2000">
+                <a:schemeClr val="accent1"/>
+              </a:gs>
+              <a:gs pos="78000">
+                <a:schemeClr val="accent1">
+                  <a:lumMod val="50000"/>
+                </a:schemeClr>
+              </a:gs>
+              <a:gs pos="100000">
+                <a:srgbClr val="000000">
+                  <a:alpha val="85000"/>
+                </a:srgbClr>
+              </a:gs>
+            </a:gsLst>
+            <a:lin ang="18000000" scaled="0"/>
+          </a:gradFill>
+          <a:ln>
+            <a:noFill/>
+          </a:ln>
+        </p:spPr>
+        <p:style>
+          <a:lnRef idx="2">
+            <a:schemeClr val="accent1">
+              <a:shade val="50000"/>
+            </a:schemeClr>
+          </a:lnRef>
+          <a:fillRef idx="1">
+            <a:schemeClr val="accent1"/>
+          </a:fillRef>
+          <a:effectRef idx="0">
+            <a:schemeClr val="accent1"/>
+          </a:effectRef>
+          <a:fontRef idx="minor">
+            <a:schemeClr val="lt1"/>
+          </a:fontRef>
+        </p:style>
+        <p:txBody>
+          <a:bodyPr rtlCol="0" anchor="ctr"/>
+          <a:lstStyle/>
+          <a:p>
+            <a:pPr algn="ctr"/>
+            <a:endParaRPr lang="en-US"/>
+          </a:p>
+        </p:txBody>
+      </p:sp>
+      <p:sp>
+        <p:nvSpPr>
+          <p:cNvPr id="19" name="Rectangle 18">
+            <a:extLst>
+              <a:ext uri="{FF2B5EF4-FFF2-40B4-BE49-F238E27FC236}">
+                <a16:creationId xmlns:a16="http://schemas.microsoft.com/office/drawing/2014/main" id="{90A7EAB6-59D3-4325-8DE6-E0CA4009CE53}"/>
+              </a:ext>
+              <a:ext uri="{C183D7F6-B498-43B3-948B-1728B52AA6E4}">
+                <adec:decorative xmlns:adec="http://schemas.microsoft.com/office/drawing/2017/decorative" val="1"/>
+              </a:ext>
+            </a:extLst>
+          </p:cNvPr>
+          <p:cNvSpPr>
+            <a:spLocks noGrp="1" noRot="1" noChangeAspect="1" noMove="1" noResize="1" noEditPoints="1" noAdjustHandles="1" noChangeArrowheads="1" noChangeShapeType="1" noTextEdit="1"/>
+          </p:cNvSpPr>
+          <p:nvPr>
+            <p:extLst>
+              <p:ext uri="{386F3935-93C4-4BCD-93E2-E3B085C9AB24}">
+                <p16:designElem xmlns:p16="http://schemas.microsoft.com/office/powerpoint/2015/main" val="1"/>
+              </p:ext>
+            </p:extLst>
+          </p:nvPr>
+        </p:nvSpPr>
+        <p:spPr>
+          <a:xfrm flipH="1">
+            <a:off x="4034537" y="1839884"/>
+            <a:ext cx="8157460" cy="5017687"/>
+          </a:xfrm>
+          <a:prstGeom prst="rect">
+            <a:avLst/>
+          </a:prstGeom>
+          <a:gradFill>
+            <a:gsLst>
+              <a:gs pos="0">
+                <a:schemeClr val="accent1">
+                  <a:lumMod val="60000"/>
+                  <a:lumOff val="40000"/>
+                  <a:alpha val="30000"/>
+                </a:schemeClr>
+              </a:gs>
+              <a:gs pos="100000">
+                <a:srgbClr val="000000">
+                  <a:alpha val="44000"/>
+                </a:srgbClr>
+              </a:gs>
+            </a:gsLst>
+            <a:lin ang="4800000" scaled="0"/>
+          </a:gradFill>
+          <a:ln>
+            <a:noFill/>
+          </a:ln>
+        </p:spPr>
+        <p:style>
+          <a:lnRef idx="2">
+            <a:schemeClr val="accent1">
+              <a:shade val="50000"/>
+            </a:schemeClr>
+          </a:lnRef>
+          <a:fillRef idx="1">
+            <a:schemeClr val="accent1"/>
+          </a:fillRef>
+          <a:effectRef idx="0">
+            <a:schemeClr val="accent1"/>
+          </a:effectRef>
+          <a:fontRef idx="minor">
+            <a:schemeClr val="lt1"/>
+          </a:fontRef>
+        </p:style>
+        <p:txBody>
+          <a:bodyPr rtlCol="0" anchor="ctr"/>
+          <a:lstStyle/>
+          <a:p>
+            <a:pPr algn="ctr"/>
+            <a:endParaRPr lang="en-US"/>
+          </a:p>
+        </p:txBody>
+      </p:sp>
+      <p:sp>
+        <p:nvSpPr>
+          <p:cNvPr id="21" name="Rectangle 20">
+            <a:extLst>
+              <a:ext uri="{FF2B5EF4-FFF2-40B4-BE49-F238E27FC236}">
+                <a16:creationId xmlns:a16="http://schemas.microsoft.com/office/drawing/2014/main" id="{A8D57A06-A426-446D-B02C-A2DC6B62E45E}"/>
+              </a:ext>
+              <a:ext uri="{C183D7F6-B498-43B3-948B-1728B52AA6E4}">
+                <adec:decorative xmlns:adec="http://schemas.microsoft.com/office/drawing/2017/decorative" val="1"/>
+              </a:ext>
+            </a:extLst>
+          </p:cNvPr>
+          <p:cNvSpPr>
+            <a:spLocks noGrp="1" noRot="1" noChangeAspect="1" noMove="1" noResize="1" noEditPoints="1" noAdjustHandles="1" noChangeArrowheads="1" noChangeShapeType="1" noTextEdit="1"/>
+          </p:cNvSpPr>
+          <p:nvPr>
+            <p:extLst>
+              <p:ext uri="{386F3935-93C4-4BCD-93E2-E3B085C9AB24}">
+                <p16:designElem xmlns:p16="http://schemas.microsoft.com/office/powerpoint/2015/main" val="1"/>
+              </p:ext>
+            </p:extLst>
+          </p:nvPr>
+        </p:nvSpPr>
+        <p:spPr>
+          <a:xfrm rot="5400000" flipH="1">
+            <a:off x="4063179" y="-33131"/>
+            <a:ext cx="6857999" cy="6923403"/>
+          </a:xfrm>
+          <a:prstGeom prst="rect">
+            <a:avLst/>
+          </a:prstGeom>
+          <a:gradFill>
+            <a:gsLst>
+              <a:gs pos="56000">
+                <a:schemeClr val="accent1">
+                  <a:lumMod val="60000"/>
+                  <a:lumOff val="40000"/>
+                  <a:alpha val="0"/>
+                </a:schemeClr>
+              </a:gs>
+              <a:gs pos="100000">
+                <a:schemeClr val="accent1"/>
+              </a:gs>
+            </a:gsLst>
+            <a:lin ang="6600000" scaled="0"/>
+          </a:gradFill>
+          <a:ln>
+            <a:noFill/>
+          </a:ln>
+        </p:spPr>
+        <p:style>
+          <a:lnRef idx="2">
+            <a:schemeClr val="accent1">
+              <a:shade val="50000"/>
+            </a:schemeClr>
+          </a:lnRef>
+          <a:fillRef idx="1">
+            <a:schemeClr val="accent1"/>
+          </a:fillRef>
+          <a:effectRef idx="0">
+            <a:schemeClr val="accent1"/>
+          </a:effectRef>
+          <a:fontRef idx="minor">
+            <a:schemeClr val="lt1"/>
+          </a:fontRef>
+        </p:style>
+        <p:txBody>
+          <a:bodyPr rtlCol="0" anchor="ctr"/>
+          <a:lstStyle/>
+          <a:p>
+            <a:pPr algn="ctr"/>
+            <a:endParaRPr lang="en-US"/>
+          </a:p>
+        </p:txBody>
+      </p:sp>
+      <p:pic>
+        <p:nvPicPr>
           <p:cNvPr id="5" name="Marcador de contenido 4">
             <a:extLst>
               <a:ext uri="{FF2B5EF4-FFF2-40B4-BE49-F238E27FC236}">
@@ -5176,6 +6304,240 @@
           </a:prstGeom>
         </p:spPr>
       </p:pic>
+      <p:sp>
+        <p:nvSpPr>
+          <p:cNvPr id="6" name="Rectángulo 5">
+            <a:extLst>
+              <a:ext uri="{FF2B5EF4-FFF2-40B4-BE49-F238E27FC236}">
+                <a16:creationId xmlns:a16="http://schemas.microsoft.com/office/drawing/2014/main" id="{D1D63763-71F5-6509-7378-785236B1CA65}"/>
+              </a:ext>
+            </a:extLst>
+          </p:cNvPr>
+          <p:cNvSpPr/>
+          <p:nvPr/>
+        </p:nvSpPr>
+        <p:spPr>
+          <a:xfrm>
+            <a:off x="609600" y="889000"/>
+            <a:ext cx="5245100" cy="5003800"/>
+          </a:xfrm>
+          <a:prstGeom prst="rect">
+            <a:avLst/>
+          </a:prstGeom>
+          <a:ln>
+            <a:solidFill>
+              <a:schemeClr val="bg1"/>
+            </a:solidFill>
+          </a:ln>
+        </p:spPr>
+        <p:style>
+          <a:lnRef idx="2">
+            <a:schemeClr val="accent6"/>
+          </a:lnRef>
+          <a:fillRef idx="1">
+            <a:schemeClr val="lt1"/>
+          </a:fillRef>
+          <a:effectRef idx="0">
+            <a:schemeClr val="accent6"/>
+          </a:effectRef>
+          <a:fontRef idx="minor">
+            <a:schemeClr val="dk1"/>
+          </a:fontRef>
+        </p:style>
+        <p:txBody>
+          <a:bodyPr rtlCol="0" anchor="ctr"/>
+          <a:lstStyle/>
+          <a:p>
+            <a:pPr algn="ctr"/>
+            <a:endParaRPr lang="es-PE"/>
+          </a:p>
+        </p:txBody>
+      </p:sp>
+      <p:sp>
+        <p:nvSpPr>
+          <p:cNvPr id="7" name="CuadroTexto 6">
+            <a:extLst>
+              <a:ext uri="{FF2B5EF4-FFF2-40B4-BE49-F238E27FC236}">
+                <a16:creationId xmlns:a16="http://schemas.microsoft.com/office/drawing/2014/main" id="{30958639-D9A0-66F3-D775-B7345582BD6F}"/>
+              </a:ext>
+            </a:extLst>
+          </p:cNvPr>
+          <p:cNvSpPr txBox="1"/>
+          <p:nvPr/>
+        </p:nvSpPr>
+        <p:spPr>
+          <a:xfrm>
+            <a:off x="453142" y="965200"/>
+            <a:ext cx="4912608" cy="4401205"/>
+          </a:xfrm>
+          <a:prstGeom prst="rect">
+            <a:avLst/>
+          </a:prstGeom>
+          <a:noFill/>
+        </p:spPr>
+        <p:txBody>
+          <a:bodyPr wrap="square" rtlCol="0">
+            <a:spAutoFit/>
+          </a:bodyPr>
+          <a:lstStyle/>
+          <a:p>
+            <a:pPr algn="l"/>
+            <a:r>
+              <a:rPr lang="es-ES" sz="2000" b="1" i="0" dirty="0">
+                <a:solidFill>
+                  <a:srgbClr val="1F2328"/>
+                </a:solidFill>
+                <a:effectLst/>
+                <a:latin typeface="-apple-system"/>
+              </a:rPr>
+              <a:t>Producto final</a:t>
+            </a:r>
+          </a:p>
+          <a:p>
+            <a:pPr algn="l"/>
+            <a:endParaRPr lang="es-ES" sz="2000" b="1" i="0" dirty="0">
+              <a:solidFill>
+                <a:srgbClr val="1F2328"/>
+              </a:solidFill>
+              <a:effectLst/>
+              <a:latin typeface="-apple-system"/>
+            </a:endParaRPr>
+          </a:p>
+          <a:p>
+            <a:pPr algn="just"/>
+            <a:r>
+              <a:rPr lang="es-ES" sz="1400" b="0" i="0" dirty="0">
+                <a:solidFill>
+                  <a:srgbClr val="1F2328"/>
+                </a:solidFill>
+                <a:effectLst/>
+                <a:latin typeface="-apple-system"/>
+              </a:rPr>
+              <a:t>Este proyecto tiene como finalidad desarrollar un sistema de alertas sísmicas basado en un modelo de clasificación no supervisada. </a:t>
+            </a:r>
+          </a:p>
+          <a:p>
+            <a:pPr algn="just"/>
+            <a:endParaRPr lang="es-ES" sz="1400" b="0" i="0" dirty="0">
+              <a:solidFill>
+                <a:srgbClr val="1F2328"/>
+              </a:solidFill>
+              <a:effectLst/>
+              <a:latin typeface="-apple-system"/>
+            </a:endParaRPr>
+          </a:p>
+          <a:p>
+            <a:pPr algn="just"/>
+            <a:r>
+              <a:rPr lang="es-ES" sz="1400" b="0" i="0" dirty="0">
+                <a:solidFill>
+                  <a:srgbClr val="1F2328"/>
+                </a:solidFill>
+                <a:effectLst/>
+                <a:latin typeface="-apple-system"/>
+              </a:rPr>
+              <a:t>También para facilitar la comprensión y la toma de decisiones informadas, el proyecto incluirá visualizaciones y mapas interactivos que mostrarán de manera clara y concisa la distribución geográfica de los sismos clasificados. </a:t>
+            </a:r>
+          </a:p>
+          <a:p>
+            <a:pPr algn="just"/>
+            <a:endParaRPr lang="es-ES" sz="1400" dirty="0">
+              <a:solidFill>
+                <a:srgbClr val="1F2328"/>
+              </a:solidFill>
+              <a:latin typeface="-apple-system"/>
+            </a:endParaRPr>
+          </a:p>
+          <a:p>
+            <a:pPr algn="just"/>
+            <a:r>
+              <a:rPr lang="es-ES" sz="1400" b="0" i="0" dirty="0">
+                <a:solidFill>
+                  <a:srgbClr val="1F2328"/>
+                </a:solidFill>
+                <a:effectLst/>
+                <a:latin typeface="-apple-system"/>
+              </a:rPr>
+              <a:t>Beneficios para la población en general y para las autoridades encargadas de la gestión de desastres en Perú:</a:t>
+            </a:r>
+          </a:p>
+          <a:p>
+            <a:pPr algn="l"/>
+            <a:endParaRPr lang="es-ES" sz="1400" b="0" i="0" dirty="0">
+              <a:solidFill>
+                <a:srgbClr val="1F2328"/>
+              </a:solidFill>
+              <a:effectLst/>
+              <a:latin typeface="-apple-system"/>
+            </a:endParaRPr>
+          </a:p>
+          <a:p>
+            <a:pPr algn="l">
+              <a:buFont typeface="Arial" panose="020B0604020202020204" pitchFamily="34" charset="0"/>
+              <a:buChar char="•"/>
+            </a:pPr>
+            <a:r>
+              <a:rPr lang="es-ES" b="1" i="0" dirty="0">
+                <a:solidFill>
+                  <a:srgbClr val="1F2328"/>
+                </a:solidFill>
+                <a:effectLst/>
+                <a:latin typeface="-apple-system"/>
+              </a:rPr>
+              <a:t>Mayor seguridad</a:t>
+            </a:r>
+          </a:p>
+          <a:p>
+            <a:pPr algn="l">
+              <a:buFont typeface="Arial" panose="020B0604020202020204" pitchFamily="34" charset="0"/>
+              <a:buChar char="•"/>
+            </a:pPr>
+            <a:r>
+              <a:rPr lang="es-ES" b="1" i="0" dirty="0">
+                <a:solidFill>
+                  <a:srgbClr val="1F2328"/>
+                </a:solidFill>
+                <a:effectLst/>
+                <a:latin typeface="-apple-system"/>
+              </a:rPr>
+              <a:t>Conciencia y preparación</a:t>
+            </a:r>
+          </a:p>
+          <a:p>
+            <a:pPr algn="l">
+              <a:buFont typeface="Arial" panose="020B0604020202020204" pitchFamily="34" charset="0"/>
+              <a:buChar char="•"/>
+            </a:pPr>
+            <a:r>
+              <a:rPr lang="es-ES" b="1" i="0" dirty="0">
+                <a:solidFill>
+                  <a:srgbClr val="1F2328"/>
+                </a:solidFill>
+                <a:effectLst/>
+                <a:latin typeface="-apple-system"/>
+              </a:rPr>
+              <a:t>Mejora de la gestión de desastres</a:t>
+            </a:r>
+          </a:p>
+          <a:p>
+            <a:pPr algn="l">
+              <a:buFont typeface="Arial" panose="020B0604020202020204" pitchFamily="34" charset="0"/>
+              <a:buChar char="•"/>
+            </a:pPr>
+            <a:r>
+              <a:rPr lang="es-ES" b="1" i="0" dirty="0">
+                <a:solidFill>
+                  <a:srgbClr val="1F2328"/>
+                </a:solidFill>
+                <a:effectLst/>
+                <a:latin typeface="-apple-system"/>
+              </a:rPr>
+              <a:t>Colaboración internacional</a:t>
+            </a:r>
+            <a:endParaRPr lang="es-PE" dirty="0"/>
+          </a:p>
+        </p:txBody>
+      </p:sp>
     </p:spTree>
     <p:extLst>
       <p:ext uri="{BB962C8B-B14F-4D97-AF65-F5344CB8AC3E}">
@@ -5189,7 +6551,7 @@
 </p:sld>
 </file>
 
-<file path=ppt/slides/slide6.xml><?xml version="1.0" encoding="utf-8"?>
+<file path=ppt/slides/slide7.xml><?xml version="1.0" encoding="utf-8"?>
 <p:sld xmlns:a="http://schemas.openxmlformats.org/drawingml/2006/main" xmlns:r="http://schemas.openxmlformats.org/officeDocument/2006/relationships" xmlns:p="http://schemas.openxmlformats.org/presentationml/2006/main">
   <p:cSld>
     <p:bg>
@@ -5953,7 +7315,7 @@
 </p:sld>
 </file>
 
-<file path=ppt/slides/slide7.xml><?xml version="1.0" encoding="utf-8"?>
+<file path=ppt/slides/slide8.xml><?xml version="1.0" encoding="utf-8"?>
 <p:sld xmlns:a="http://schemas.openxmlformats.org/drawingml/2006/main" xmlns:r="http://schemas.openxmlformats.org/officeDocument/2006/relationships" xmlns:p="http://schemas.openxmlformats.org/presentationml/2006/main">
   <p:cSld>
     <p:bg>
@@ -6763,7 +8125,7 @@
 </p:sld>
 </file>
 
-<file path=ppt/slides/slide8.xml><?xml version="1.0" encoding="utf-8"?>
+<file path=ppt/slides/slide9.xml><?xml version="1.0" encoding="utf-8"?>
 <p:sld xmlns:a="http://schemas.openxmlformats.org/drawingml/2006/main" xmlns:r="http://schemas.openxmlformats.org/officeDocument/2006/relationships" xmlns:p="http://schemas.openxmlformats.org/presentationml/2006/main">
   <p:cSld>
     <p:bg>
@@ -7147,387 +8509,6 @@
     <p:extLst>
       <p:ext uri="{BB962C8B-B14F-4D97-AF65-F5344CB8AC3E}">
         <p14:creationId xmlns:p14="http://schemas.microsoft.com/office/powerpoint/2010/main" val="2591432097"/>
-      </p:ext>
-    </p:extLst>
-  </p:cSld>
-  <p:clrMapOvr>
-    <a:masterClrMapping/>
-  </p:clrMapOvr>
-</p:sld>
-</file>
-
-<file path=ppt/slides/slide9.xml><?xml version="1.0" encoding="utf-8"?>
-<p:sld xmlns:a="http://schemas.openxmlformats.org/drawingml/2006/main" xmlns:r="http://schemas.openxmlformats.org/officeDocument/2006/relationships" xmlns:p="http://schemas.openxmlformats.org/presentationml/2006/main">
-  <p:cSld>
-    <p:bg>
-      <p:bgPr>
-        <a:solidFill>
-          <a:schemeClr val="bg1"/>
-        </a:solidFill>
-        <a:effectLst/>
-      </p:bgPr>
-    </p:bg>
-    <p:spTree>
-      <p:nvGrpSpPr>
-        <p:cNvPr id="1" name=""/>
-        <p:cNvGrpSpPr/>
-        <p:nvPr/>
-      </p:nvGrpSpPr>
-      <p:grpSpPr>
-        <a:xfrm>
-          <a:off x="0" y="0"/>
-          <a:ext cx="0" cy="0"/>
-          <a:chOff x="0" y="0"/>
-          <a:chExt cx="0" cy="0"/>
-        </a:xfrm>
-      </p:grpSpPr>
-      <p:sp useBgFill="1">
-        <p:nvSpPr>
-          <p:cNvPr id="10" name="Rectangle 9">
-            <a:extLst>
-              <a:ext uri="{FF2B5EF4-FFF2-40B4-BE49-F238E27FC236}">
-                <a16:creationId xmlns:a16="http://schemas.microsoft.com/office/drawing/2014/main" id="{AB8C311F-7253-4AED-9701-7FC0708C41C7}"/>
-              </a:ext>
-              <a:ext uri="{C183D7F6-B498-43B3-948B-1728B52AA6E4}">
-                <adec:decorative xmlns:adec="http://schemas.microsoft.com/office/drawing/2017/decorative" val="1"/>
-              </a:ext>
-            </a:extLst>
-          </p:cNvPr>
-          <p:cNvSpPr>
-            <a:spLocks noGrp="1" noRot="1" noChangeAspect="1" noMove="1" noResize="1" noEditPoints="1" noAdjustHandles="1" noChangeArrowheads="1" noChangeShapeType="1" noTextEdit="1"/>
-          </p:cNvSpPr>
-          <p:nvPr>
-            <p:extLst>
-              <p:ext uri="{386F3935-93C4-4BCD-93E2-E3B085C9AB24}">
-                <p16:designElem xmlns:p16="http://schemas.microsoft.com/office/powerpoint/2015/main" val="1"/>
-              </p:ext>
-            </p:extLst>
-          </p:nvPr>
-        </p:nvSpPr>
-        <p:spPr>
-          <a:xfrm>
-            <a:off x="0" y="0"/>
-            <a:ext cx="12192000" cy="6858000"/>
-          </a:xfrm>
-          <a:prstGeom prst="rect">
-            <a:avLst/>
-          </a:prstGeom>
-          <a:ln w="12700" cap="flat" cmpd="sng" algn="ctr">
-            <a:noFill/>
-            <a:prstDash val="solid"/>
-            <a:miter lim="800000"/>
-          </a:ln>
-          <a:effectLst/>
-          <a:extLst>
-            <a:ext uri="{91240B29-F687-4F45-9708-019B960494DF}">
-              <a14:hiddenLine xmlns:a14="http://schemas.microsoft.com/office/drawing/2010/main" w="12700" cap="flat" cmpd="sng" algn="ctr">
-                <a:solidFill>
-                  <a:schemeClr val="accent1">
-                    <a:shade val="50000"/>
-                  </a:schemeClr>
-                </a:solidFill>
-                <a:prstDash val="solid"/>
-                <a:miter lim="800000"/>
-              </a14:hiddenLine>
-            </a:ext>
-          </a:extLst>
-        </p:spPr>
-        <p:style>
-          <a:lnRef idx="2">
-            <a:schemeClr val="accent1">
-              <a:shade val="50000"/>
-            </a:schemeClr>
-          </a:lnRef>
-          <a:fillRef idx="1">
-            <a:schemeClr val="accent1"/>
-          </a:fillRef>
-          <a:effectRef idx="0">
-            <a:schemeClr val="accent1"/>
-          </a:effectRef>
-          <a:fontRef idx="minor">
-            <a:schemeClr val="lt1"/>
-          </a:fontRef>
-        </p:style>
-        <p:txBody>
-          <a:bodyPr rtlCol="0" anchor="ctr"/>
-          <a:lstStyle/>
-          <a:p>
-            <a:pPr algn="ctr"/>
-            <a:endParaRPr lang="en-US"/>
-          </a:p>
-        </p:txBody>
-      </p:sp>
-      <p:sp>
-        <p:nvSpPr>
-          <p:cNvPr id="12" name="Rectangle 11">
-            <a:extLst>
-              <a:ext uri="{FF2B5EF4-FFF2-40B4-BE49-F238E27FC236}">
-                <a16:creationId xmlns:a16="http://schemas.microsoft.com/office/drawing/2014/main" id="{FD073016-B734-483B-8953-5BADEE145112}"/>
-              </a:ext>
-              <a:ext uri="{C183D7F6-B498-43B3-948B-1728B52AA6E4}">
-                <adec:decorative xmlns:adec="http://schemas.microsoft.com/office/drawing/2017/decorative" val="1"/>
-              </a:ext>
-            </a:extLst>
-          </p:cNvPr>
-          <p:cNvSpPr>
-            <a:spLocks noGrp="1" noRot="1" noChangeAspect="1" noMove="1" noResize="1" noEditPoints="1" noAdjustHandles="1" noChangeArrowheads="1" noChangeShapeType="1" noTextEdit="1"/>
-          </p:cNvSpPr>
-          <p:nvPr>
-            <p:extLst>
-              <p:ext uri="{386F3935-93C4-4BCD-93E2-E3B085C9AB24}">
-                <p16:designElem xmlns:p16="http://schemas.microsoft.com/office/powerpoint/2015/main" val="1"/>
-              </p:ext>
-            </p:extLst>
-          </p:nvPr>
-        </p:nvSpPr>
-        <p:spPr>
-          <a:xfrm>
-            <a:off x="4038600" y="0"/>
-            <a:ext cx="8157458" cy="6858000"/>
-          </a:xfrm>
-          <a:prstGeom prst="rect">
-            <a:avLst/>
-          </a:prstGeom>
-          <a:gradFill>
-            <a:gsLst>
-              <a:gs pos="2000">
-                <a:schemeClr val="accent1"/>
-              </a:gs>
-              <a:gs pos="78000">
-                <a:schemeClr val="accent1">
-                  <a:lumMod val="50000"/>
-                </a:schemeClr>
-              </a:gs>
-              <a:gs pos="100000">
-                <a:srgbClr val="000000">
-                  <a:alpha val="85000"/>
-                </a:srgbClr>
-              </a:gs>
-            </a:gsLst>
-            <a:lin ang="18000000" scaled="0"/>
-          </a:gradFill>
-          <a:ln>
-            <a:noFill/>
-          </a:ln>
-        </p:spPr>
-        <p:style>
-          <a:lnRef idx="2">
-            <a:schemeClr val="accent1">
-              <a:shade val="50000"/>
-            </a:schemeClr>
-          </a:lnRef>
-          <a:fillRef idx="1">
-            <a:schemeClr val="accent1"/>
-          </a:fillRef>
-          <a:effectRef idx="0">
-            <a:schemeClr val="accent1"/>
-          </a:effectRef>
-          <a:fontRef idx="minor">
-            <a:schemeClr val="lt1"/>
-          </a:fontRef>
-        </p:style>
-        <p:txBody>
-          <a:bodyPr rtlCol="0" anchor="ctr"/>
-          <a:lstStyle/>
-          <a:p>
-            <a:pPr algn="ctr"/>
-            <a:endParaRPr lang="en-US"/>
-          </a:p>
-        </p:txBody>
-      </p:sp>
-      <p:sp>
-        <p:nvSpPr>
-          <p:cNvPr id="14" name="Rectangle 13">
-            <a:extLst>
-              <a:ext uri="{FF2B5EF4-FFF2-40B4-BE49-F238E27FC236}">
-                <a16:creationId xmlns:a16="http://schemas.microsoft.com/office/drawing/2014/main" id="{90A7EAB6-59D3-4325-8DE6-E0CA4009CE53}"/>
-              </a:ext>
-              <a:ext uri="{C183D7F6-B498-43B3-948B-1728B52AA6E4}">
-                <adec:decorative xmlns:adec="http://schemas.microsoft.com/office/drawing/2017/decorative" val="1"/>
-              </a:ext>
-            </a:extLst>
-          </p:cNvPr>
-          <p:cNvSpPr>
-            <a:spLocks noGrp="1" noRot="1" noChangeAspect="1" noMove="1" noResize="1" noEditPoints="1" noAdjustHandles="1" noChangeArrowheads="1" noChangeShapeType="1" noTextEdit="1"/>
-          </p:cNvSpPr>
-          <p:nvPr>
-            <p:extLst>
-              <p:ext uri="{386F3935-93C4-4BCD-93E2-E3B085C9AB24}">
-                <p16:designElem xmlns:p16="http://schemas.microsoft.com/office/powerpoint/2015/main" val="1"/>
-              </p:ext>
-            </p:extLst>
-          </p:nvPr>
-        </p:nvSpPr>
-        <p:spPr>
-          <a:xfrm flipH="1">
-            <a:off x="4034537" y="1839884"/>
-            <a:ext cx="8157460" cy="5017687"/>
-          </a:xfrm>
-          <a:prstGeom prst="rect">
-            <a:avLst/>
-          </a:prstGeom>
-          <a:gradFill>
-            <a:gsLst>
-              <a:gs pos="0">
-                <a:schemeClr val="accent1">
-                  <a:lumMod val="60000"/>
-                  <a:lumOff val="40000"/>
-                  <a:alpha val="30000"/>
-                </a:schemeClr>
-              </a:gs>
-              <a:gs pos="100000">
-                <a:srgbClr val="000000">
-                  <a:alpha val="44000"/>
-                </a:srgbClr>
-              </a:gs>
-            </a:gsLst>
-            <a:lin ang="4800000" scaled="0"/>
-          </a:gradFill>
-          <a:ln>
-            <a:noFill/>
-          </a:ln>
-        </p:spPr>
-        <p:style>
-          <a:lnRef idx="2">
-            <a:schemeClr val="accent1">
-              <a:shade val="50000"/>
-            </a:schemeClr>
-          </a:lnRef>
-          <a:fillRef idx="1">
-            <a:schemeClr val="accent1"/>
-          </a:fillRef>
-          <a:effectRef idx="0">
-            <a:schemeClr val="accent1"/>
-          </a:effectRef>
-          <a:fontRef idx="minor">
-            <a:schemeClr val="lt1"/>
-          </a:fontRef>
-        </p:style>
-        <p:txBody>
-          <a:bodyPr rtlCol="0" anchor="ctr"/>
-          <a:lstStyle/>
-          <a:p>
-            <a:pPr algn="ctr"/>
-            <a:endParaRPr lang="en-US"/>
-          </a:p>
-        </p:txBody>
-      </p:sp>
-      <p:sp>
-        <p:nvSpPr>
-          <p:cNvPr id="16" name="Rectangle 15">
-            <a:extLst>
-              <a:ext uri="{FF2B5EF4-FFF2-40B4-BE49-F238E27FC236}">
-                <a16:creationId xmlns:a16="http://schemas.microsoft.com/office/drawing/2014/main" id="{A8D57A06-A426-446D-B02C-A2DC6B62E45E}"/>
-              </a:ext>
-              <a:ext uri="{C183D7F6-B498-43B3-948B-1728B52AA6E4}">
-                <adec:decorative xmlns:adec="http://schemas.microsoft.com/office/drawing/2017/decorative" val="1"/>
-              </a:ext>
-            </a:extLst>
-          </p:cNvPr>
-          <p:cNvSpPr>
-            <a:spLocks noGrp="1" noRot="1" noChangeAspect="1" noMove="1" noResize="1" noEditPoints="1" noAdjustHandles="1" noChangeArrowheads="1" noChangeShapeType="1" noTextEdit="1"/>
-          </p:cNvSpPr>
-          <p:nvPr>
-            <p:extLst>
-              <p:ext uri="{386F3935-93C4-4BCD-93E2-E3B085C9AB24}">
-                <p16:designElem xmlns:p16="http://schemas.microsoft.com/office/powerpoint/2015/main" val="1"/>
-              </p:ext>
-            </p:extLst>
-          </p:nvPr>
-        </p:nvSpPr>
-        <p:spPr>
-          <a:xfrm rot="5400000" flipH="1">
-            <a:off x="4063179" y="-33131"/>
-            <a:ext cx="6857999" cy="6923403"/>
-          </a:xfrm>
-          <a:prstGeom prst="rect">
-            <a:avLst/>
-          </a:prstGeom>
-          <a:gradFill>
-            <a:gsLst>
-              <a:gs pos="56000">
-                <a:schemeClr val="accent1">
-                  <a:lumMod val="60000"/>
-                  <a:lumOff val="40000"/>
-                  <a:alpha val="0"/>
-                </a:schemeClr>
-              </a:gs>
-              <a:gs pos="100000">
-                <a:schemeClr val="accent1"/>
-              </a:gs>
-            </a:gsLst>
-            <a:lin ang="6600000" scaled="0"/>
-          </a:gradFill>
-          <a:ln>
-            <a:noFill/>
-          </a:ln>
-        </p:spPr>
-        <p:style>
-          <a:lnRef idx="2">
-            <a:schemeClr val="accent1">
-              <a:shade val="50000"/>
-            </a:schemeClr>
-          </a:lnRef>
-          <a:fillRef idx="1">
-            <a:schemeClr val="accent1"/>
-          </a:fillRef>
-          <a:effectRef idx="0">
-            <a:schemeClr val="accent1"/>
-          </a:effectRef>
-          <a:fontRef idx="minor">
-            <a:schemeClr val="lt1"/>
-          </a:fontRef>
-        </p:style>
-        <p:txBody>
-          <a:bodyPr rtlCol="0" anchor="ctr"/>
-          <a:lstStyle/>
-          <a:p>
-            <a:pPr algn="ctr"/>
-            <a:endParaRPr lang="en-US"/>
-          </a:p>
-        </p:txBody>
-      </p:sp>
-      <p:pic>
-        <p:nvPicPr>
-          <p:cNvPr id="5" name="Marcador de contenido 4" descr="Texto&#10;&#10;Descripción generada automáticamente con confianza media">
-            <a:extLst>
-              <a:ext uri="{FF2B5EF4-FFF2-40B4-BE49-F238E27FC236}">
-                <a16:creationId xmlns:a16="http://schemas.microsoft.com/office/drawing/2014/main" id="{8B447023-B011-957F-E3BC-BA17E5376A8A}"/>
-              </a:ext>
-            </a:extLst>
-          </p:cNvPr>
-          <p:cNvPicPr>
-            <a:picLocks noGrp="1" noChangeAspect="1"/>
-          </p:cNvPicPr>
-          <p:nvPr>
-            <p:ph idx="1"/>
-          </p:nvPr>
-        </p:nvPicPr>
-        <p:blipFill rotWithShape="1">
-          <a:blip r:embed="rId2">
-            <a:extLst>
-              <a:ext uri="{28A0092B-C50C-407E-A947-70E740481C1C}">
-                <a14:useLocalDpi xmlns:a14="http://schemas.microsoft.com/office/drawing/2010/main" val="0"/>
-              </a:ext>
-            </a:extLst>
-          </a:blip>
-          <a:srcRect t="1694" b="4612"/>
-          <a:stretch/>
-        </p:blipFill>
-        <p:spPr>
-          <a:xfrm>
-            <a:off x="457200" y="457200"/>
-            <a:ext cx="11277600" cy="5943600"/>
-          </a:xfrm>
-          <a:prstGeom prst="rect">
-            <a:avLst/>
-          </a:prstGeom>
-        </p:spPr>
-      </p:pic>
-    </p:spTree>
-    <p:extLst>
-      <p:ext uri="{BB962C8B-B14F-4D97-AF65-F5344CB8AC3E}">
-        <p14:creationId xmlns:p14="http://schemas.microsoft.com/office/powerpoint/2010/main" val="2357855530"/>
       </p:ext>
     </p:extLst>
   </p:cSld>

</xml_diff>